<commit_message>
Fix airline plots for pres
</commit_message>
<xml_diff>
--- a/linsley_postdoc/presentations/weekly_meetings/1_18_24.pptx
+++ b/linsley_postdoc/presentations/weekly_meetings/1_18_24.pptx
@@ -217,7 +217,7 @@
           <a:p>
             <a:fld id="{E933A773-0DCE-3544-BB67-D5FA58DF903C}" type="datetimeFigureOut">
               <a:rPr lang="en-US" smtClean="0"/>
-              <a:t>1/13/24</a:t>
+              <a:t>1/14/24</a:t>
             </a:fld>
             <a:endParaRPr lang="en-US"/>
           </a:p>
@@ -1900,7 +1900,7 @@
           <a:p>
             <a:fld id="{80FC6068-BAFB-FC44-B9D8-F4B3BB105DE6}" type="datetimeFigureOut">
               <a:rPr lang="en-US" smtClean="0"/>
-              <a:t>1/13/24</a:t>
+              <a:t>1/14/24</a:t>
             </a:fld>
             <a:endParaRPr lang="en-US"/>
           </a:p>
@@ -2098,7 +2098,7 @@
           <a:p>
             <a:fld id="{80FC6068-BAFB-FC44-B9D8-F4B3BB105DE6}" type="datetimeFigureOut">
               <a:rPr lang="en-US" smtClean="0"/>
-              <a:t>1/13/24</a:t>
+              <a:t>1/14/24</a:t>
             </a:fld>
             <a:endParaRPr lang="en-US"/>
           </a:p>
@@ -2306,7 +2306,7 @@
           <a:p>
             <a:fld id="{80FC6068-BAFB-FC44-B9D8-F4B3BB105DE6}" type="datetimeFigureOut">
               <a:rPr lang="en-US" smtClean="0"/>
-              <a:t>1/13/24</a:t>
+              <a:t>1/14/24</a:t>
             </a:fld>
             <a:endParaRPr lang="en-US"/>
           </a:p>
@@ -2510,7 +2510,7 @@
           <a:p>
             <a:fld id="{80FC6068-BAFB-FC44-B9D8-F4B3BB105DE6}" type="datetimeFigureOut">
               <a:rPr lang="en-US" smtClean="0"/>
-              <a:t>1/13/24</a:t>
+              <a:t>1/14/24</a:t>
             </a:fld>
             <a:endParaRPr lang="en-US"/>
           </a:p>
@@ -2801,7 +2801,7 @@
           <a:p>
             <a:fld id="{80FC6068-BAFB-FC44-B9D8-F4B3BB105DE6}" type="datetimeFigureOut">
               <a:rPr lang="en-US" smtClean="0"/>
-              <a:t>1/13/24</a:t>
+              <a:t>1/14/24</a:t>
             </a:fld>
             <a:endParaRPr lang="en-US"/>
           </a:p>
@@ -3066,7 +3066,7 @@
           <a:p>
             <a:fld id="{80FC6068-BAFB-FC44-B9D8-F4B3BB105DE6}" type="datetimeFigureOut">
               <a:rPr lang="en-US" smtClean="0"/>
-              <a:t>1/13/24</a:t>
+              <a:t>1/14/24</a:t>
             </a:fld>
             <a:endParaRPr lang="en-US"/>
           </a:p>
@@ -3478,7 +3478,7 @@
           <a:p>
             <a:fld id="{80FC6068-BAFB-FC44-B9D8-F4B3BB105DE6}" type="datetimeFigureOut">
               <a:rPr lang="en-US" smtClean="0"/>
-              <a:t>1/13/24</a:t>
+              <a:t>1/14/24</a:t>
             </a:fld>
             <a:endParaRPr lang="en-US"/>
           </a:p>
@@ -3619,7 +3619,7 @@
           <a:p>
             <a:fld id="{80FC6068-BAFB-FC44-B9D8-F4B3BB105DE6}" type="datetimeFigureOut">
               <a:rPr lang="en-US" smtClean="0"/>
-              <a:t>1/13/24</a:t>
+              <a:t>1/14/24</a:t>
             </a:fld>
             <a:endParaRPr lang="en-US"/>
           </a:p>
@@ -3732,7 +3732,7 @@
           <a:p>
             <a:fld id="{80FC6068-BAFB-FC44-B9D8-F4B3BB105DE6}" type="datetimeFigureOut">
               <a:rPr lang="en-US" smtClean="0"/>
-              <a:t>1/13/24</a:t>
+              <a:t>1/14/24</a:t>
             </a:fld>
             <a:endParaRPr lang="en-US"/>
           </a:p>
@@ -4043,7 +4043,7 @@
           <a:p>
             <a:fld id="{80FC6068-BAFB-FC44-B9D8-F4B3BB105DE6}" type="datetimeFigureOut">
               <a:rPr lang="en-US" smtClean="0"/>
-              <a:t>1/13/24</a:t>
+              <a:t>1/14/24</a:t>
             </a:fld>
             <a:endParaRPr lang="en-US"/>
           </a:p>
@@ -4331,7 +4331,7 @@
           <a:p>
             <a:fld id="{80FC6068-BAFB-FC44-B9D8-F4B3BB105DE6}" type="datetimeFigureOut">
               <a:rPr lang="en-US" smtClean="0"/>
-              <a:t>1/13/24</a:t>
+              <a:t>1/14/24</a:t>
             </a:fld>
             <a:endParaRPr lang="en-US"/>
           </a:p>
@@ -4572,7 +4572,7 @@
           <a:p>
             <a:fld id="{80FC6068-BAFB-FC44-B9D8-F4B3BB105DE6}" type="datetimeFigureOut">
               <a:rPr lang="en-US" smtClean="0"/>
-              <a:t>1/13/24</a:t>
+              <a:t>1/14/24</a:t>
             </a:fld>
             <a:endParaRPr lang="en-US"/>
           </a:p>
@@ -5994,7 +5994,7 @@
           <a:p>
             <a:r>
               <a:rPr lang="en-US" dirty="0"/>
-              <a:t>In colitis dataset, junctions of CD4 proliferating cells mostly shared with…</a:t>
+              <a:t>In colitis dataset, junctions of CD4 proliferating cells mostly shared with CD4 TCM, CD8 TEM, CD8 Naïve cells</a:t>
             </a:r>
           </a:p>
         </p:txBody>
@@ -6021,8 +6021,8 @@
         </p:blipFill>
         <p:spPr>
           <a:xfrm>
-            <a:off x="0" y="2640059"/>
-            <a:ext cx="6050030" cy="3846028"/>
+            <a:off x="652690" y="2019274"/>
+            <a:ext cx="4435165" cy="2819452"/>
           </a:xfrm>
           <a:prstGeom prst="rect">
             <a:avLst/>
@@ -6043,7 +6043,7 @@
         </p:nvSpPr>
         <p:spPr>
           <a:xfrm>
-            <a:off x="2353901" y="2270727"/>
+            <a:off x="2353901" y="1676514"/>
             <a:ext cx="554960" cy="369332"/>
           </a:xfrm>
           <a:prstGeom prst="rect">
@@ -6086,8 +6086,8 @@
         </p:blipFill>
         <p:spPr>
           <a:xfrm>
-            <a:off x="5994148" y="2640059"/>
-            <a:ext cx="6197852" cy="3846028"/>
+            <a:off x="6311678" y="2019274"/>
+            <a:ext cx="4543530" cy="2819452"/>
           </a:xfrm>
           <a:prstGeom prst="rect">
             <a:avLst/>
@@ -6108,7 +6108,7 @@
         </p:nvSpPr>
         <p:spPr>
           <a:xfrm>
-            <a:off x="8255060" y="2270727"/>
+            <a:off x="8255060" y="1676514"/>
             <a:ext cx="554960" cy="369332"/>
           </a:xfrm>
           <a:prstGeom prst="rect">
@@ -6125,45 +6125,6 @@
             <a:r>
               <a:rPr lang="en-US" dirty="0"/>
               <a:t>TRB</a:t>
-            </a:r>
-          </a:p>
-        </p:txBody>
-      </p:sp>
-      <p:sp>
-        <p:nvSpPr>
-          <p:cNvPr id="9" name="TextBox 8">
-            <a:extLst>
-              <a:ext uri="{FF2B5EF4-FFF2-40B4-BE49-F238E27FC236}">
-                <a16:creationId xmlns:a16="http://schemas.microsoft.com/office/drawing/2014/main" id="{5F2BB90B-CAB4-DE8B-1B7A-F491E33F9439}"/>
-              </a:ext>
-            </a:extLst>
-          </p:cNvPr>
-          <p:cNvSpPr txBox="1"/>
-          <p:nvPr/>
-        </p:nvSpPr>
-        <p:spPr>
-          <a:xfrm>
-            <a:off x="3226279" y="6460208"/>
-            <a:ext cx="5203925" cy="369332"/>
-          </a:xfrm>
-          <a:prstGeom prst="rect">
-            <a:avLst/>
-          </a:prstGeom>
-          <a:noFill/>
-        </p:spPr>
-        <p:txBody>
-          <a:bodyPr wrap="none" rtlCol="0">
-            <a:spAutoFit/>
-          </a:bodyPr>
-          <a:lstStyle/>
-          <a:p>
-            <a:r>
-              <a:rPr lang="en-US" dirty="0" err="1"/>
-              <a:t>Downsampled</a:t>
-            </a:r>
-            <a:r>
-              <a:rPr lang="en-US" dirty="0"/>
-              <a:t> linkages to 1500 (crashed R otherwise)</a:t>
             </a:r>
           </a:p>
         </p:txBody>
@@ -6190,8 +6151,8 @@
         </p:blipFill>
         <p:spPr>
           <a:xfrm>
-            <a:off x="564317" y="4447055"/>
-            <a:ext cx="3887187" cy="2197819"/>
+            <a:off x="349293" y="4826527"/>
+            <a:ext cx="3592979" cy="2031474"/>
           </a:xfrm>
           <a:prstGeom prst="rect">
             <a:avLst/>
@@ -6220,14 +6181,55 @@
         </p:blipFill>
         <p:spPr>
           <a:xfrm>
-            <a:off x="6614347" y="4217942"/>
-            <a:ext cx="4076517" cy="2271449"/>
+            <a:off x="7841481" y="4758470"/>
+            <a:ext cx="3767978" cy="2099530"/>
           </a:xfrm>
           <a:prstGeom prst="rect">
             <a:avLst/>
           </a:prstGeom>
         </p:spPr>
       </p:pic>
+      <p:sp>
+        <p:nvSpPr>
+          <p:cNvPr id="3" name="TextBox 2">
+            <a:extLst>
+              <a:ext uri="{FF2B5EF4-FFF2-40B4-BE49-F238E27FC236}">
+                <a16:creationId xmlns:a16="http://schemas.microsoft.com/office/drawing/2014/main" id="{59212FDE-E8CF-45B9-0E3D-5454A3063D90}"/>
+              </a:ext>
+            </a:extLst>
+          </p:cNvPr>
+          <p:cNvSpPr txBox="1"/>
+          <p:nvPr/>
+        </p:nvSpPr>
+        <p:spPr>
+          <a:xfrm>
+            <a:off x="4339087" y="5941109"/>
+            <a:ext cx="2870273" cy="646331"/>
+          </a:xfrm>
+          <a:prstGeom prst="rect">
+            <a:avLst/>
+          </a:prstGeom>
+          <a:noFill/>
+        </p:spPr>
+        <p:txBody>
+          <a:bodyPr wrap="none" rtlCol="0">
+            <a:spAutoFit/>
+          </a:bodyPr>
+          <a:lstStyle/>
+          <a:p>
+            <a:r>
+              <a:rPr lang="en-US" dirty="0"/>
+              <a:t>Chose 1500 random linkages</a:t>
+            </a:r>
+          </a:p>
+          <a:p>
+            <a:r>
+              <a:rPr lang="en-US" dirty="0"/>
+              <a:t>to plot (memory limit)</a:t>
+            </a:r>
+          </a:p>
+        </p:txBody>
+      </p:sp>
     </p:spTree>
     <p:extLst>
       <p:ext uri="{BB962C8B-B14F-4D97-AF65-F5344CB8AC3E}">
@@ -6282,13 +6284,13 @@
         </p:spPr>
         <p:txBody>
           <a:bodyPr>
-            <a:normAutofit/>
+            <a:normAutofit fontScale="90000"/>
           </a:bodyPr>
           <a:lstStyle/>
           <a:p>
             <a:r>
               <a:rPr lang="en-US" dirty="0"/>
-              <a:t>In colitis dataset, junctions of CD8 naive cells mostly shared with…</a:t>
+              <a:t>In colitis dataset, junctions of CD8 naive cells mostly shared with CD8 TEMs, themselves, CD8 proliferating cells</a:t>
             </a:r>
           </a:p>
         </p:txBody>
@@ -6377,8 +6379,8 @@
         </p:nvSpPr>
         <p:spPr>
           <a:xfrm>
-            <a:off x="3226279" y="6460208"/>
-            <a:ext cx="5203925" cy="369332"/>
+            <a:off x="4339087" y="5941109"/>
+            <a:ext cx="2870273" cy="646331"/>
           </a:xfrm>
           <a:prstGeom prst="rect">
             <a:avLst/>
@@ -6392,22 +6394,24 @@
           <a:lstStyle/>
           <a:p>
             <a:r>
-              <a:rPr lang="en-US" dirty="0" err="1"/>
-              <a:t>Downsampled</a:t>
-            </a:r>
-            <a:r>
               <a:rPr lang="en-US" dirty="0"/>
-              <a:t> linkages to 1500 (crashed R otherwise)</a:t>
+              <a:t>Chose 1500 random linkages</a:t>
+            </a:r>
+          </a:p>
+          <a:p>
+            <a:r>
+              <a:rPr lang="en-US" dirty="0"/>
+              <a:t>to plot (memory limit)</a:t>
             </a:r>
           </a:p>
         </p:txBody>
       </p:sp>
       <p:pic>
         <p:nvPicPr>
-          <p:cNvPr id="10" name="Picture 9">
-            <a:extLst>
-              <a:ext uri="{FF2B5EF4-FFF2-40B4-BE49-F238E27FC236}">
-                <a16:creationId xmlns:a16="http://schemas.microsoft.com/office/drawing/2014/main" id="{DDA2D948-7ED7-75E9-4FAA-61F673C72F29}"/>
+          <p:cNvPr id="4" name="Picture 3">
+            <a:extLst>
+              <a:ext uri="{FF2B5EF4-FFF2-40B4-BE49-F238E27FC236}">
+                <a16:creationId xmlns:a16="http://schemas.microsoft.com/office/drawing/2014/main" id="{CE885C88-96C8-2B03-1B67-147A40CBA173}"/>
               </a:ext>
             </a:extLst>
           </p:cNvPr>
@@ -6424,8 +6428,8 @@
         </p:blipFill>
         <p:spPr>
           <a:xfrm>
-            <a:off x="60385" y="2755749"/>
-            <a:ext cx="5961595" cy="3704459"/>
+            <a:off x="60903" y="4690203"/>
+            <a:ext cx="3740390" cy="2116171"/>
           </a:xfrm>
           <a:prstGeom prst="rect">
             <a:avLst/>
@@ -6434,10 +6438,10 @@
       </p:pic>
       <p:pic>
         <p:nvPicPr>
-          <p:cNvPr id="3" name="Picture 2">
-            <a:extLst>
-              <a:ext uri="{FF2B5EF4-FFF2-40B4-BE49-F238E27FC236}">
-                <a16:creationId xmlns:a16="http://schemas.microsoft.com/office/drawing/2014/main" id="{05A2B630-4B06-9F45-666F-55EE6B7B8796}"/>
+          <p:cNvPr id="12" name="Picture 11">
+            <a:extLst>
+              <a:ext uri="{FF2B5EF4-FFF2-40B4-BE49-F238E27FC236}">
+                <a16:creationId xmlns:a16="http://schemas.microsoft.com/office/drawing/2014/main" id="{D2C5F328-9B4A-BE07-C206-553B0E37D4F7}"/>
               </a:ext>
             </a:extLst>
           </p:cNvPr>
@@ -6454,20 +6458,90 @@
         </p:blipFill>
         <p:spPr>
           <a:xfrm>
-            <a:off x="5931305" y="2727389"/>
-            <a:ext cx="5961595" cy="3761178"/>
+            <a:off x="8430204" y="4720196"/>
+            <a:ext cx="3742723" cy="2056187"/>
           </a:xfrm>
           <a:prstGeom prst="rect">
             <a:avLst/>
           </a:prstGeom>
         </p:spPr>
       </p:pic>
+      <p:sp>
+        <p:nvSpPr>
+          <p:cNvPr id="11" name="TextBox 10">
+            <a:extLst>
+              <a:ext uri="{FF2B5EF4-FFF2-40B4-BE49-F238E27FC236}">
+                <a16:creationId xmlns:a16="http://schemas.microsoft.com/office/drawing/2014/main" id="{4F64B2C6-0909-95E1-8AAF-2FC4431B4CDC}"/>
+              </a:ext>
+            </a:extLst>
+          </p:cNvPr>
+          <p:cNvSpPr txBox="1"/>
+          <p:nvPr/>
+        </p:nvSpPr>
+        <p:spPr>
+          <a:xfrm>
+            <a:off x="2332420" y="1667459"/>
+            <a:ext cx="554960" cy="369332"/>
+          </a:xfrm>
+          <a:prstGeom prst="rect">
+            <a:avLst/>
+          </a:prstGeom>
+          <a:noFill/>
+        </p:spPr>
+        <p:txBody>
+          <a:bodyPr wrap="square" rtlCol="0">
+            <a:spAutoFit/>
+          </a:bodyPr>
+          <a:lstStyle/>
+          <a:p>
+            <a:r>
+              <a:rPr lang="en-US" dirty="0"/>
+              <a:t>TRA</a:t>
+            </a:r>
+          </a:p>
+        </p:txBody>
+      </p:sp>
+      <p:sp>
+        <p:nvSpPr>
+          <p:cNvPr id="13" name="TextBox 12">
+            <a:extLst>
+              <a:ext uri="{FF2B5EF4-FFF2-40B4-BE49-F238E27FC236}">
+                <a16:creationId xmlns:a16="http://schemas.microsoft.com/office/drawing/2014/main" id="{BFBAE360-9A20-9F23-2E54-7B8657494657}"/>
+              </a:ext>
+            </a:extLst>
+          </p:cNvPr>
+          <p:cNvSpPr txBox="1"/>
+          <p:nvPr/>
+        </p:nvSpPr>
+        <p:spPr>
+          <a:xfrm>
+            <a:off x="8233579" y="1667459"/>
+            <a:ext cx="554960" cy="369332"/>
+          </a:xfrm>
+          <a:prstGeom prst="rect">
+            <a:avLst/>
+          </a:prstGeom>
+          <a:noFill/>
+        </p:spPr>
+        <p:txBody>
+          <a:bodyPr wrap="square" rtlCol="0">
+            <a:spAutoFit/>
+          </a:bodyPr>
+          <a:lstStyle/>
+          <a:p>
+            <a:r>
+              <a:rPr lang="en-US" dirty="0"/>
+              <a:t>TRB</a:t>
+            </a:r>
+          </a:p>
+        </p:txBody>
+      </p:sp>
       <p:pic>
         <p:nvPicPr>
-          <p:cNvPr id="4" name="Picture 3">
-            <a:extLst>
-              <a:ext uri="{FF2B5EF4-FFF2-40B4-BE49-F238E27FC236}">
-                <a16:creationId xmlns:a16="http://schemas.microsoft.com/office/drawing/2014/main" id="{CE885C88-96C8-2B03-1B67-147A40CBA173}"/>
+          <p:cNvPr id="14" name="Picture 13">
+            <a:extLst>
+              <a:ext uri="{FF2B5EF4-FFF2-40B4-BE49-F238E27FC236}">
+                <a16:creationId xmlns:a16="http://schemas.microsoft.com/office/drawing/2014/main" id="{99CFC7A6-9C01-A576-A6E1-5EA1047AF3F3}"/>
               </a:ext>
             </a:extLst>
           </p:cNvPr>
@@ -6484,8 +6558,8 @@
         </p:blipFill>
         <p:spPr>
           <a:xfrm>
-            <a:off x="483706" y="4228347"/>
-            <a:ext cx="3740390" cy="2116171"/>
+            <a:off x="765569" y="1964871"/>
+            <a:ext cx="4286583" cy="2749883"/>
           </a:xfrm>
           <a:prstGeom prst="rect">
             <a:avLst/>
@@ -6494,10 +6568,10 @@
       </p:pic>
       <p:pic>
         <p:nvPicPr>
-          <p:cNvPr id="12" name="Picture 11">
-            <a:extLst>
-              <a:ext uri="{FF2B5EF4-FFF2-40B4-BE49-F238E27FC236}">
-                <a16:creationId xmlns:a16="http://schemas.microsoft.com/office/drawing/2014/main" id="{D2C5F328-9B4A-BE07-C206-553B0E37D4F7}"/>
+          <p:cNvPr id="15" name="Picture 14">
+            <a:extLst>
+              <a:ext uri="{FF2B5EF4-FFF2-40B4-BE49-F238E27FC236}">
+                <a16:creationId xmlns:a16="http://schemas.microsoft.com/office/drawing/2014/main" id="{EAAB3A7F-8FAD-CC6F-8FF6-FEDAE18450BF}"/>
               </a:ext>
             </a:extLst>
           </p:cNvPr>
@@ -6514,8 +6588,8 @@
         </p:blipFill>
         <p:spPr>
           <a:xfrm>
-            <a:off x="7159924" y="4773353"/>
-            <a:ext cx="3742723" cy="2056187"/>
+            <a:off x="6290824" y="1964871"/>
+            <a:ext cx="4440470" cy="2747342"/>
           </a:xfrm>
           <a:prstGeom prst="rect">
             <a:avLst/>

</xml_diff>